<commit_message>
Just a save point
</commit_message>
<xml_diff>
--- a/_1  Assess/$Requirements/Requirement Pictures.pptx
+++ b/_1  Assess/$Requirements/Requirement Pictures.pptx
@@ -213,7 +213,7 @@
           <a:p>
             <a:fld id="{90B77117-200D-4C24-9444-A3272AC92708}" type="datetimeFigureOut">
               <a:rPr lang="en-US" smtClean="0"/>
-              <a:t>3/1/2025</a:t>
+              <a:t>3/26/2025</a:t>
             </a:fld>
             <a:endParaRPr lang="en-US"/>
           </a:p>
@@ -903,7 +903,7 @@
           <a:p>
             <a:fld id="{C0029B18-9E45-4374-8673-2D4794710B00}" type="datetimeFigureOut">
               <a:rPr lang="en-US" smtClean="0"/>
-              <a:t>3/1/2025</a:t>
+              <a:t>3/26/2025</a:t>
             </a:fld>
             <a:endParaRPr lang="en-US"/>
           </a:p>
@@ -1101,7 +1101,7 @@
           <a:p>
             <a:fld id="{C0029B18-9E45-4374-8673-2D4794710B00}" type="datetimeFigureOut">
               <a:rPr lang="en-US" smtClean="0"/>
-              <a:t>3/1/2025</a:t>
+              <a:t>3/26/2025</a:t>
             </a:fld>
             <a:endParaRPr lang="en-US"/>
           </a:p>
@@ -1309,7 +1309,7 @@
           <a:p>
             <a:fld id="{C0029B18-9E45-4374-8673-2D4794710B00}" type="datetimeFigureOut">
               <a:rPr lang="en-US" smtClean="0"/>
-              <a:t>3/1/2025</a:t>
+              <a:t>3/26/2025</a:t>
             </a:fld>
             <a:endParaRPr lang="en-US"/>
           </a:p>
@@ -1507,7 +1507,7 @@
           <a:p>
             <a:fld id="{C0029B18-9E45-4374-8673-2D4794710B00}" type="datetimeFigureOut">
               <a:rPr lang="en-US" smtClean="0"/>
-              <a:t>3/1/2025</a:t>
+              <a:t>3/26/2025</a:t>
             </a:fld>
             <a:endParaRPr lang="en-US"/>
           </a:p>
@@ -1782,7 +1782,7 @@
           <a:p>
             <a:fld id="{C0029B18-9E45-4374-8673-2D4794710B00}" type="datetimeFigureOut">
               <a:rPr lang="en-US" smtClean="0"/>
-              <a:t>3/1/2025</a:t>
+              <a:t>3/26/2025</a:t>
             </a:fld>
             <a:endParaRPr lang="en-US"/>
           </a:p>
@@ -2047,7 +2047,7 @@
           <a:p>
             <a:fld id="{C0029B18-9E45-4374-8673-2D4794710B00}" type="datetimeFigureOut">
               <a:rPr lang="en-US" smtClean="0"/>
-              <a:t>3/1/2025</a:t>
+              <a:t>3/26/2025</a:t>
             </a:fld>
             <a:endParaRPr lang="en-US"/>
           </a:p>
@@ -2459,7 +2459,7 @@
           <a:p>
             <a:fld id="{C0029B18-9E45-4374-8673-2D4794710B00}" type="datetimeFigureOut">
               <a:rPr lang="en-US" smtClean="0"/>
-              <a:t>3/1/2025</a:t>
+              <a:t>3/26/2025</a:t>
             </a:fld>
             <a:endParaRPr lang="en-US"/>
           </a:p>
@@ -2600,7 +2600,7 @@
           <a:p>
             <a:fld id="{C0029B18-9E45-4374-8673-2D4794710B00}" type="datetimeFigureOut">
               <a:rPr lang="en-US" smtClean="0"/>
-              <a:t>3/1/2025</a:t>
+              <a:t>3/26/2025</a:t>
             </a:fld>
             <a:endParaRPr lang="en-US"/>
           </a:p>
@@ -2713,7 +2713,7 @@
           <a:p>
             <a:fld id="{C0029B18-9E45-4374-8673-2D4794710B00}" type="datetimeFigureOut">
               <a:rPr lang="en-US" smtClean="0"/>
-              <a:t>3/1/2025</a:t>
+              <a:t>3/26/2025</a:t>
             </a:fld>
             <a:endParaRPr lang="en-US"/>
           </a:p>
@@ -3024,7 +3024,7 @@
           <a:p>
             <a:fld id="{C0029B18-9E45-4374-8673-2D4794710B00}" type="datetimeFigureOut">
               <a:rPr lang="en-US" smtClean="0"/>
-              <a:t>3/1/2025</a:t>
+              <a:t>3/26/2025</a:t>
             </a:fld>
             <a:endParaRPr lang="en-US"/>
           </a:p>
@@ -3312,7 +3312,7 @@
           <a:p>
             <a:fld id="{C0029B18-9E45-4374-8673-2D4794710B00}" type="datetimeFigureOut">
               <a:rPr lang="en-US" smtClean="0"/>
-              <a:t>3/1/2025</a:t>
+              <a:t>3/26/2025</a:t>
             </a:fld>
             <a:endParaRPr lang="en-US"/>
           </a:p>
@@ -3553,7 +3553,7 @@
           <a:p>
             <a:fld id="{C0029B18-9E45-4374-8673-2D4794710B00}" type="datetimeFigureOut">
               <a:rPr lang="en-US" smtClean="0"/>
-              <a:t>3/1/2025</a:t>
+              <a:t>3/26/2025</a:t>
             </a:fld>
             <a:endParaRPr lang="en-US"/>
           </a:p>
@@ -9290,7 +9290,7 @@
         </p:blipFill>
         <p:spPr>
           <a:xfrm>
-            <a:off x="1177902" y="2210765"/>
+            <a:off x="949807" y="3518001"/>
             <a:ext cx="7096821" cy="4410207"/>
           </a:xfrm>
           <a:prstGeom prst="rect">
@@ -9728,14 +9728,7 @@
             <a:pPr algn="ctr"/>
             <a:r>
               <a:rPr lang="en-US" dirty="0"/>
-              <a:t>Spec</a:t>
-            </a:r>
-          </a:p>
-          <a:p>
-            <a:pPr algn="ctr"/>
-            <a:r>
-              <a:rPr lang="en-US" dirty="0"/>
-              <a:t>1 Fill Hi</a:t>
+              <a:t>Spec 1 Fill Hi</a:t>
             </a:r>
           </a:p>
         </p:txBody>
@@ -9790,14 +9783,7 @@
             <a:pPr algn="ctr"/>
             <a:r>
               <a:rPr lang="en-US" dirty="0"/>
-              <a:t>Spec</a:t>
-            </a:r>
-          </a:p>
-          <a:p>
-            <a:pPr algn="ctr"/>
-            <a:r>
-              <a:rPr lang="en-US" dirty="0"/>
-              <a:t>1 Fill Lo</a:t>
+              <a:t>Spec 1 Fill Lo</a:t>
             </a:r>
           </a:p>
         </p:txBody>
@@ -9895,8 +9881,8 @@
         </p:nvSpPr>
         <p:spPr>
           <a:xfrm>
-            <a:off x="3306871" y="986837"/>
-            <a:ext cx="1206289" cy="552801"/>
+            <a:off x="3140765" y="986837"/>
+            <a:ext cx="1372395" cy="552801"/>
           </a:xfrm>
           <a:prstGeom prst="wedgeRectCallout">
             <a:avLst>
@@ -9931,14 +9917,14 @@
             <a:pPr algn="ctr"/>
             <a:r>
               <a:rPr lang="en-US" dirty="0"/>
-              <a:t>Target </a:t>
+              <a:t>Target  TP</a:t>
             </a:r>
           </a:p>
           <a:p>
             <a:pPr algn="ctr"/>
             <a:r>
               <a:rPr lang="en-US" dirty="0"/>
-              <a:t>Test point</a:t>
+              <a:t>(Test point)</a:t>
             </a:r>
           </a:p>
         </p:txBody>
@@ -10111,6 +10097,369 @@
               <a:rPr lang="en-US" dirty="0"/>
               <a:t>Target TP Uncertainty</a:t>
             </a:r>
+          </a:p>
+        </p:txBody>
+      </p:sp>
+      <p:sp>
+        <p:nvSpPr>
+          <p:cNvPr id="2" name="TextBox 1">
+            <a:extLst>
+              <a:ext uri="{FF2B5EF4-FFF2-40B4-BE49-F238E27FC236}">
+                <a16:creationId xmlns:a16="http://schemas.microsoft.com/office/drawing/2014/main" id="{B82A8124-271A-066D-75DB-3046BA7518EC}"/>
+              </a:ext>
+            </a:extLst>
+          </p:cNvPr>
+          <p:cNvSpPr txBox="1"/>
+          <p:nvPr/>
+        </p:nvSpPr>
+        <p:spPr>
+          <a:xfrm>
+            <a:off x="5296989" y="1910533"/>
+            <a:ext cx="1512337" cy="369332"/>
+          </a:xfrm>
+          <a:prstGeom prst="rect">
+            <a:avLst/>
+          </a:prstGeom>
+          <a:noFill/>
+        </p:spPr>
+        <p:txBody>
+          <a:bodyPr wrap="none" rtlCol="0">
+            <a:spAutoFit/>
+          </a:bodyPr>
+          <a:lstStyle/>
+          <a:p>
+            <a:r>
+              <a:rPr lang="en-US" dirty="0"/>
+              <a:t>Test Set Point</a:t>
+            </a:r>
+          </a:p>
+        </p:txBody>
+      </p:sp>
+      <p:cxnSp>
+        <p:nvCxnSpPr>
+          <p:cNvPr id="3" name="Straight Arrow Connector 2">
+            <a:extLst>
+              <a:ext uri="{FF2B5EF4-FFF2-40B4-BE49-F238E27FC236}">
+                <a16:creationId xmlns:a16="http://schemas.microsoft.com/office/drawing/2014/main" id="{E4F90F02-F44C-DDF4-B9E7-464C53084904}"/>
+              </a:ext>
+            </a:extLst>
+          </p:cNvPr>
+          <p:cNvCxnSpPr>
+            <a:cxnSpLocks/>
+            <a:stCxn id="2" idx="1"/>
+          </p:cNvCxnSpPr>
+          <p:nvPr/>
+        </p:nvCxnSpPr>
+        <p:spPr>
+          <a:xfrm flipH="1">
+            <a:off x="4757876" y="2095199"/>
+            <a:ext cx="539113" cy="0"/>
+          </a:xfrm>
+          <a:prstGeom prst="straightConnector1">
+            <a:avLst/>
+          </a:prstGeom>
+          <a:ln>
+            <a:tailEnd type="triangle"/>
+          </a:ln>
+        </p:spPr>
+        <p:style>
+          <a:lnRef idx="2">
+            <a:schemeClr val="accent1"/>
+          </a:lnRef>
+          <a:fillRef idx="0">
+            <a:schemeClr val="accent1"/>
+          </a:fillRef>
+          <a:effectRef idx="1">
+            <a:schemeClr val="accent1"/>
+          </a:effectRef>
+          <a:fontRef idx="minor">
+            <a:schemeClr val="tx1"/>
+          </a:fontRef>
+        </p:style>
+      </p:cxnSp>
+      <p:sp>
+        <p:nvSpPr>
+          <p:cNvPr id="4" name="TextBox 3">
+            <a:extLst>
+              <a:ext uri="{FF2B5EF4-FFF2-40B4-BE49-F238E27FC236}">
+                <a16:creationId xmlns:a16="http://schemas.microsoft.com/office/drawing/2014/main" id="{A5A1803B-6EE0-78FA-D87E-723082C2BF91}"/>
+              </a:ext>
+            </a:extLst>
+          </p:cNvPr>
+          <p:cNvSpPr txBox="1"/>
+          <p:nvPr/>
+        </p:nvSpPr>
+        <p:spPr>
+          <a:xfrm>
+            <a:off x="5810942" y="864762"/>
+            <a:ext cx="1459438" cy="369332"/>
+          </a:xfrm>
+          <a:prstGeom prst="rect">
+            <a:avLst/>
+          </a:prstGeom>
+          <a:noFill/>
+        </p:spPr>
+        <p:txBody>
+          <a:bodyPr wrap="none" rtlCol="0">
+            <a:spAutoFit/>
+          </a:bodyPr>
+          <a:lstStyle/>
+          <a:p>
+            <a:r>
+              <a:rPr lang="en-US" dirty="0"/>
+              <a:t> Switch Point</a:t>
+            </a:r>
+          </a:p>
+        </p:txBody>
+      </p:sp>
+      <p:cxnSp>
+        <p:nvCxnSpPr>
+          <p:cNvPr id="5" name="Straight Arrow Connector 4">
+            <a:extLst>
+              <a:ext uri="{FF2B5EF4-FFF2-40B4-BE49-F238E27FC236}">
+                <a16:creationId xmlns:a16="http://schemas.microsoft.com/office/drawing/2014/main" id="{EFAAFF0B-C4F3-2E6F-64AE-0BA625FFC158}"/>
+              </a:ext>
+            </a:extLst>
+          </p:cNvPr>
+          <p:cNvCxnSpPr>
+            <a:cxnSpLocks/>
+          </p:cNvCxnSpPr>
+          <p:nvPr/>
+        </p:nvCxnSpPr>
+        <p:spPr>
+          <a:xfrm flipH="1">
+            <a:off x="5794399" y="1165253"/>
+            <a:ext cx="224400" cy="0"/>
+          </a:xfrm>
+          <a:prstGeom prst="straightConnector1">
+            <a:avLst/>
+          </a:prstGeom>
+          <a:ln>
+            <a:tailEnd type="triangle"/>
+          </a:ln>
+        </p:spPr>
+        <p:style>
+          <a:lnRef idx="2">
+            <a:schemeClr val="accent1"/>
+          </a:lnRef>
+          <a:fillRef idx="0">
+            <a:schemeClr val="accent1"/>
+          </a:fillRef>
+          <a:effectRef idx="1">
+            <a:schemeClr val="accent1"/>
+          </a:effectRef>
+          <a:fontRef idx="minor">
+            <a:schemeClr val="tx1"/>
+          </a:fontRef>
+        </p:style>
+      </p:cxnSp>
+      <p:cxnSp>
+        <p:nvCxnSpPr>
+          <p:cNvPr id="8" name="Straight Connector 7">
+            <a:extLst>
+              <a:ext uri="{FF2B5EF4-FFF2-40B4-BE49-F238E27FC236}">
+                <a16:creationId xmlns:a16="http://schemas.microsoft.com/office/drawing/2014/main" id="{5E560E97-22F3-1985-4A94-DE04BCAA4689}"/>
+              </a:ext>
+            </a:extLst>
+          </p:cNvPr>
+          <p:cNvCxnSpPr/>
+          <p:nvPr/>
+        </p:nvCxnSpPr>
+        <p:spPr>
+          <a:xfrm>
+            <a:off x="5787882" y="891249"/>
+            <a:ext cx="0" cy="519416"/>
+          </a:xfrm>
+          <a:prstGeom prst="line">
+            <a:avLst/>
+          </a:prstGeom>
+        </p:spPr>
+        <p:style>
+          <a:lnRef idx="2">
+            <a:schemeClr val="accent1"/>
+          </a:lnRef>
+          <a:fillRef idx="0">
+            <a:schemeClr val="accent1"/>
+          </a:fillRef>
+          <a:effectRef idx="1">
+            <a:schemeClr val="accent1"/>
+          </a:effectRef>
+          <a:fontRef idx="minor">
+            <a:schemeClr val="tx1"/>
+          </a:fontRef>
+        </p:style>
+      </p:cxnSp>
+      <p:cxnSp>
+        <p:nvCxnSpPr>
+          <p:cNvPr id="10" name="Straight Connector 9">
+            <a:extLst>
+              <a:ext uri="{FF2B5EF4-FFF2-40B4-BE49-F238E27FC236}">
+                <a16:creationId xmlns:a16="http://schemas.microsoft.com/office/drawing/2014/main" id="{2FDC3C83-455D-6203-9477-29E3EBB84D37}"/>
+              </a:ext>
+            </a:extLst>
+          </p:cNvPr>
+          <p:cNvCxnSpPr>
+            <a:cxnSpLocks/>
+          </p:cNvCxnSpPr>
+          <p:nvPr/>
+        </p:nvCxnSpPr>
+        <p:spPr>
+          <a:xfrm flipV="1">
+            <a:off x="4997078" y="2281904"/>
+            <a:ext cx="0" cy="192342"/>
+          </a:xfrm>
+          <a:prstGeom prst="line">
+            <a:avLst/>
+          </a:prstGeom>
+        </p:spPr>
+        <p:style>
+          <a:lnRef idx="2">
+            <a:schemeClr val="accent1"/>
+          </a:lnRef>
+          <a:fillRef idx="0">
+            <a:schemeClr val="accent1"/>
+          </a:fillRef>
+          <a:effectRef idx="1">
+            <a:schemeClr val="accent1"/>
+          </a:effectRef>
+          <a:fontRef idx="minor">
+            <a:schemeClr val="tx1"/>
+          </a:fontRef>
+        </p:style>
+      </p:cxnSp>
+      <p:cxnSp>
+        <p:nvCxnSpPr>
+          <p:cNvPr id="11" name="Straight Connector 10">
+            <a:extLst>
+              <a:ext uri="{FF2B5EF4-FFF2-40B4-BE49-F238E27FC236}">
+                <a16:creationId xmlns:a16="http://schemas.microsoft.com/office/drawing/2014/main" id="{6B312285-E642-F5A2-B1F8-842D61E60FFF}"/>
+              </a:ext>
+            </a:extLst>
+          </p:cNvPr>
+          <p:cNvCxnSpPr>
+            <a:cxnSpLocks/>
+          </p:cNvCxnSpPr>
+          <p:nvPr/>
+        </p:nvCxnSpPr>
+        <p:spPr>
+          <a:xfrm flipV="1">
+            <a:off x="4758696" y="2291186"/>
+            <a:ext cx="0" cy="192342"/>
+          </a:xfrm>
+          <a:prstGeom prst="line">
+            <a:avLst/>
+          </a:prstGeom>
+        </p:spPr>
+        <p:style>
+          <a:lnRef idx="2">
+            <a:schemeClr val="accent1"/>
+          </a:lnRef>
+          <a:fillRef idx="0">
+            <a:schemeClr val="accent1"/>
+          </a:fillRef>
+          <a:effectRef idx="1">
+            <a:schemeClr val="accent1"/>
+          </a:effectRef>
+          <a:fontRef idx="minor">
+            <a:schemeClr val="tx1"/>
+          </a:fontRef>
+        </p:style>
+      </p:cxnSp>
+      <p:cxnSp>
+        <p:nvCxnSpPr>
+          <p:cNvPr id="12" name="Straight Arrow Connector 11">
+            <a:extLst>
+              <a:ext uri="{FF2B5EF4-FFF2-40B4-BE49-F238E27FC236}">
+                <a16:creationId xmlns:a16="http://schemas.microsoft.com/office/drawing/2014/main" id="{6042765C-E13F-E994-E090-0BC765B74330}"/>
+              </a:ext>
+            </a:extLst>
+          </p:cNvPr>
+          <p:cNvCxnSpPr>
+            <a:cxnSpLocks/>
+          </p:cNvCxnSpPr>
+          <p:nvPr/>
+        </p:nvCxnSpPr>
+        <p:spPr>
+          <a:xfrm>
+            <a:off x="4783272" y="2386784"/>
+            <a:ext cx="199627" cy="0"/>
+          </a:xfrm>
+          <a:prstGeom prst="straightConnector1">
+            <a:avLst/>
+          </a:prstGeom>
+          <a:ln>
+            <a:headEnd type="triangle"/>
+            <a:tailEnd type="triangle"/>
+          </a:ln>
+        </p:spPr>
+        <p:style>
+          <a:lnRef idx="2">
+            <a:schemeClr val="accent1"/>
+          </a:lnRef>
+          <a:fillRef idx="0">
+            <a:schemeClr val="accent1"/>
+          </a:fillRef>
+          <a:effectRef idx="1">
+            <a:schemeClr val="accent1"/>
+          </a:effectRef>
+          <a:fontRef idx="minor">
+            <a:schemeClr val="tx1"/>
+          </a:fontRef>
+        </p:style>
+      </p:cxnSp>
+      <p:sp>
+        <p:nvSpPr>
+          <p:cNvPr id="13" name="Speech Bubble: Rectangle 12">
+            <a:extLst>
+              <a:ext uri="{FF2B5EF4-FFF2-40B4-BE49-F238E27FC236}">
+                <a16:creationId xmlns:a16="http://schemas.microsoft.com/office/drawing/2014/main" id="{491B212A-FCCF-F9E1-B75C-CCC007D4104D}"/>
+              </a:ext>
+            </a:extLst>
+          </p:cNvPr>
+          <p:cNvSpPr/>
+          <p:nvPr/>
+        </p:nvSpPr>
+        <p:spPr>
+          <a:xfrm>
+            <a:off x="5622875" y="2425067"/>
+            <a:ext cx="1378500" cy="346966"/>
+          </a:xfrm>
+          <a:prstGeom prst="wedgeRectCallout">
+            <a:avLst>
+              <a:gd name="adj1" fmla="val -94771"/>
+              <a:gd name="adj2" fmla="val -72295"/>
+            </a:avLst>
+          </a:prstGeom>
+          <a:ln w="9525">
+            <a:solidFill>
+              <a:schemeClr val="accent1"/>
+            </a:solidFill>
+          </a:ln>
+        </p:spPr>
+        <p:style>
+          <a:lnRef idx="2">
+            <a:schemeClr val="accent6"/>
+          </a:lnRef>
+          <a:fillRef idx="1">
+            <a:schemeClr val="lt1"/>
+          </a:fillRef>
+          <a:effectRef idx="0">
+            <a:schemeClr val="accent6"/>
+          </a:effectRef>
+          <a:fontRef idx="minor">
+            <a:schemeClr val="dk1"/>
+          </a:fontRef>
+        </p:style>
+        <p:txBody>
+          <a:bodyPr rtlCol="0" anchor="ctr"/>
+          <a:lstStyle/>
+          <a:p>
+            <a:pPr algn="ctr"/>
+            <a:r>
+              <a:rPr lang="en-US" dirty="0" err="1"/>
+              <a:t>RNG_Stop</a:t>
+            </a:r>
+            <a:endParaRPr lang="en-US" dirty="0"/>
           </a:p>
         </p:txBody>
       </p:sp>

</xml_diff>